<commit_message>
bit of cleanup on code
</commit_message>
<xml_diff>
--- a/Submission/Pioneers_DSEATS_Africa_2025_Slides.pptx
+++ b/Submission/Pioneers_DSEATS_Africa_2025_Slides.pptx
@@ -206,7 +206,7 @@
           <a:p>
             <a:fld id="{F9C092EC-2D3E-44F4-8E33-43B9FF9C4C45}" type="datetimeFigureOut">
               <a:rPr lang="en-NG" smtClean="0"/>
-              <a:t>07/21/2025</a:t>
+              <a:t>07/28/2025</a:t>
             </a:fld>
             <a:endParaRPr lang="en-NG"/>
           </a:p>
@@ -623,7 +623,7 @@
           <a:p>
             <a:fld id="{19275A14-8125-4A01-902D-8D47BE088195}" type="datetimeFigureOut">
               <a:rPr lang="en-NG" smtClean="0"/>
-              <a:t>07/21/2025</a:t>
+              <a:t>07/28/2025</a:t>
             </a:fld>
             <a:endParaRPr lang="en-NG"/>
           </a:p>
@@ -823,7 +823,7 @@
           <a:p>
             <a:fld id="{19275A14-8125-4A01-902D-8D47BE088195}" type="datetimeFigureOut">
               <a:rPr lang="en-NG" smtClean="0"/>
-              <a:t>07/21/2025</a:t>
+              <a:t>07/28/2025</a:t>
             </a:fld>
             <a:endParaRPr lang="en-NG"/>
           </a:p>
@@ -1033,7 +1033,7 @@
           <a:p>
             <a:fld id="{19275A14-8125-4A01-902D-8D47BE088195}" type="datetimeFigureOut">
               <a:rPr lang="en-NG" smtClean="0"/>
-              <a:t>07/21/2025</a:t>
+              <a:t>07/28/2025</a:t>
             </a:fld>
             <a:endParaRPr lang="en-NG"/>
           </a:p>
@@ -1410,7 +1410,7 @@
           <a:p>
             <a:fld id="{19275A14-8125-4A01-902D-8D47BE088195}" type="datetimeFigureOut">
               <a:rPr lang="en-NG" smtClean="0"/>
-              <a:t>07/21/2025</a:t>
+              <a:t>07/28/2025</a:t>
             </a:fld>
             <a:endParaRPr lang="en-NG"/>
           </a:p>
@@ -1686,7 +1686,7 @@
           <a:p>
             <a:fld id="{19275A14-8125-4A01-902D-8D47BE088195}" type="datetimeFigureOut">
               <a:rPr lang="en-NG" smtClean="0"/>
-              <a:t>07/21/2025</a:t>
+              <a:t>07/28/2025</a:t>
             </a:fld>
             <a:endParaRPr lang="en-NG"/>
           </a:p>
@@ -1954,7 +1954,7 @@
           <a:p>
             <a:fld id="{19275A14-8125-4A01-902D-8D47BE088195}" type="datetimeFigureOut">
               <a:rPr lang="en-NG" smtClean="0"/>
-              <a:t>07/21/2025</a:t>
+              <a:t>07/28/2025</a:t>
             </a:fld>
             <a:endParaRPr lang="en-NG"/>
           </a:p>
@@ -2369,7 +2369,7 @@
           <a:p>
             <a:fld id="{19275A14-8125-4A01-902D-8D47BE088195}" type="datetimeFigureOut">
               <a:rPr lang="en-NG" smtClean="0"/>
-              <a:t>07/21/2025</a:t>
+              <a:t>07/28/2025</a:t>
             </a:fld>
             <a:endParaRPr lang="en-NG"/>
           </a:p>
@@ -2511,7 +2511,7 @@
           <a:p>
             <a:fld id="{19275A14-8125-4A01-902D-8D47BE088195}" type="datetimeFigureOut">
               <a:rPr lang="en-NG" smtClean="0"/>
-              <a:t>07/21/2025</a:t>
+              <a:t>07/28/2025</a:t>
             </a:fld>
             <a:endParaRPr lang="en-NG"/>
           </a:p>
@@ -2624,7 +2624,7 @@
           <a:p>
             <a:fld id="{19275A14-8125-4A01-902D-8D47BE088195}" type="datetimeFigureOut">
               <a:rPr lang="en-NG" smtClean="0"/>
-              <a:t>07/21/2025</a:t>
+              <a:t>07/28/2025</a:t>
             </a:fld>
             <a:endParaRPr lang="en-NG"/>
           </a:p>
@@ -2937,7 +2937,7 @@
           <a:p>
             <a:fld id="{19275A14-8125-4A01-902D-8D47BE088195}" type="datetimeFigureOut">
               <a:rPr lang="en-NG" smtClean="0"/>
-              <a:t>07/21/2025</a:t>
+              <a:t>07/28/2025</a:t>
             </a:fld>
             <a:endParaRPr lang="en-NG"/>
           </a:p>
@@ -3226,7 +3226,7 @@
           <a:p>
             <a:fld id="{19275A14-8125-4A01-902D-8D47BE088195}" type="datetimeFigureOut">
               <a:rPr lang="en-NG" smtClean="0"/>
-              <a:t>07/21/2025</a:t>
+              <a:t>07/28/2025</a:t>
             </a:fld>
             <a:endParaRPr lang="en-NG"/>
           </a:p>
@@ -3469,7 +3469,7 @@
           <a:p>
             <a:fld id="{19275A14-8125-4A01-902D-8D47BE088195}" type="datetimeFigureOut">
               <a:rPr lang="en-NG" smtClean="0"/>
-              <a:t>07/21/2025</a:t>
+              <a:t>07/28/2025</a:t>
             </a:fld>
             <a:endParaRPr lang="en-NG"/>
           </a:p>

</xml_diff>